<commit_message>
sw prototyping update and much more
</commit_message>
<xml_diff>
--- a/docs/src/slides.pptx
+++ b/docs/src/slides.pptx
@@ -5,12 +5,12 @@
     <p:sldMasterId id="2147483660" r:id="rId1"/>
   </p:sldMasterIdLst>
   <p:sldIdLst>
-    <p:sldId id="256" r:id="rId2"/>
-    <p:sldId id="257" r:id="rId3"/>
-    <p:sldId id="258" r:id="rId4"/>
-    <p:sldId id="260" r:id="rId5"/>
-    <p:sldId id="259" r:id="rId6"/>
-    <p:sldId id="263" r:id="rId7"/>
+    <p:sldId id="263" r:id="rId2"/>
+    <p:sldId id="256" r:id="rId3"/>
+    <p:sldId id="257" r:id="rId4"/>
+    <p:sldId id="258" r:id="rId5"/>
+    <p:sldId id="260" r:id="rId6"/>
+    <p:sldId id="259" r:id="rId7"/>
     <p:sldId id="262" r:id="rId8"/>
     <p:sldId id="261" r:id="rId9"/>
   </p:sldIdLst>
@@ -266,7 +266,7 @@
           <a:p>
             <a:fld id="{DC85F91E-8240-4DFB-9DD9-E63C913D9276}" type="datetimeFigureOut">
               <a:rPr lang="ru-RU" smtClean="0"/>
-              <a:t>12.01.2019</a:t>
+              <a:t>01.06.2019</a:t>
             </a:fld>
             <a:endParaRPr lang="ru-RU"/>
           </a:p>
@@ -436,7 +436,7 @@
           <a:p>
             <a:fld id="{DC85F91E-8240-4DFB-9DD9-E63C913D9276}" type="datetimeFigureOut">
               <a:rPr lang="ru-RU" smtClean="0"/>
-              <a:t>12.01.2019</a:t>
+              <a:t>01.06.2019</a:t>
             </a:fld>
             <a:endParaRPr lang="ru-RU"/>
           </a:p>
@@ -616,7 +616,7 @@
           <a:p>
             <a:fld id="{DC85F91E-8240-4DFB-9DD9-E63C913D9276}" type="datetimeFigureOut">
               <a:rPr lang="ru-RU" smtClean="0"/>
-              <a:t>12.01.2019</a:t>
+              <a:t>01.06.2019</a:t>
             </a:fld>
             <a:endParaRPr lang="ru-RU"/>
           </a:p>
@@ -786,7 +786,7 @@
           <a:p>
             <a:fld id="{DC85F91E-8240-4DFB-9DD9-E63C913D9276}" type="datetimeFigureOut">
               <a:rPr lang="ru-RU" smtClean="0"/>
-              <a:t>12.01.2019</a:t>
+              <a:t>01.06.2019</a:t>
             </a:fld>
             <a:endParaRPr lang="ru-RU"/>
           </a:p>
@@ -1030,7 +1030,7 @@
           <a:p>
             <a:fld id="{DC85F91E-8240-4DFB-9DD9-E63C913D9276}" type="datetimeFigureOut">
               <a:rPr lang="ru-RU" smtClean="0"/>
-              <a:t>12.01.2019</a:t>
+              <a:t>01.06.2019</a:t>
             </a:fld>
             <a:endParaRPr lang="ru-RU"/>
           </a:p>
@@ -1262,7 +1262,7 @@
           <a:p>
             <a:fld id="{DC85F91E-8240-4DFB-9DD9-E63C913D9276}" type="datetimeFigureOut">
               <a:rPr lang="ru-RU" smtClean="0"/>
-              <a:t>12.01.2019</a:t>
+              <a:t>01.06.2019</a:t>
             </a:fld>
             <a:endParaRPr lang="ru-RU"/>
           </a:p>
@@ -1629,7 +1629,7 @@
           <a:p>
             <a:fld id="{DC85F91E-8240-4DFB-9DD9-E63C913D9276}" type="datetimeFigureOut">
               <a:rPr lang="ru-RU" smtClean="0"/>
-              <a:t>12.01.2019</a:t>
+              <a:t>01.06.2019</a:t>
             </a:fld>
             <a:endParaRPr lang="ru-RU"/>
           </a:p>
@@ -1747,7 +1747,7 @@
           <a:p>
             <a:fld id="{DC85F91E-8240-4DFB-9DD9-E63C913D9276}" type="datetimeFigureOut">
               <a:rPr lang="ru-RU" smtClean="0"/>
-              <a:t>12.01.2019</a:t>
+              <a:t>01.06.2019</a:t>
             </a:fld>
             <a:endParaRPr lang="ru-RU"/>
           </a:p>
@@ -1842,7 +1842,7 @@
           <a:p>
             <a:fld id="{DC85F91E-8240-4DFB-9DD9-E63C913D9276}" type="datetimeFigureOut">
               <a:rPr lang="ru-RU" smtClean="0"/>
-              <a:t>12.01.2019</a:t>
+              <a:t>01.06.2019</a:t>
             </a:fld>
             <a:endParaRPr lang="ru-RU"/>
           </a:p>
@@ -2119,7 +2119,7 @@
           <a:p>
             <a:fld id="{DC85F91E-8240-4DFB-9DD9-E63C913D9276}" type="datetimeFigureOut">
               <a:rPr lang="ru-RU" smtClean="0"/>
-              <a:t>12.01.2019</a:t>
+              <a:t>01.06.2019</a:t>
             </a:fld>
             <a:endParaRPr lang="ru-RU"/>
           </a:p>
@@ -2376,7 +2376,7 @@
           <a:p>
             <a:fld id="{DC85F91E-8240-4DFB-9DD9-E63C913D9276}" type="datetimeFigureOut">
               <a:rPr lang="ru-RU" smtClean="0"/>
-              <a:t>12.01.2019</a:t>
+              <a:t>01.06.2019</a:t>
             </a:fld>
             <a:endParaRPr lang="ru-RU"/>
           </a:p>
@@ -2589,7 +2589,7 @@
           <a:p>
             <a:fld id="{DC85F91E-8240-4DFB-9DD9-E63C913D9276}" type="datetimeFigureOut">
               <a:rPr lang="ru-RU" smtClean="0"/>
-              <a:t>12.01.2019</a:t>
+              <a:t>01.06.2019</a:t>
             </a:fld>
             <a:endParaRPr lang="ru-RU"/>
           </a:p>
@@ -2978,6 +2978,1687 @@
 </file>
 
 <file path=ppt/slides/slide1.xml><?xml version="1.0" encoding="utf-8"?>
+<p:sld xmlns:a="http://schemas.openxmlformats.org/drawingml/2006/main" xmlns:r="http://schemas.openxmlformats.org/officeDocument/2006/relationships" xmlns:p="http://schemas.openxmlformats.org/presentationml/2006/main">
+  <p:cSld>
+    <p:spTree>
+      <p:nvGrpSpPr>
+        <p:cNvPr id="1" name=""/>
+        <p:cNvGrpSpPr/>
+        <p:nvPr/>
+      </p:nvGrpSpPr>
+      <p:grpSpPr>
+        <a:xfrm>
+          <a:off x="0" y="0"/>
+          <a:ext cx="0" cy="0"/>
+          <a:chOff x="0" y="0"/>
+          <a:chExt cx="0" cy="0"/>
+        </a:xfrm>
+      </p:grpSpPr>
+      <p:cxnSp>
+        <p:nvCxnSpPr>
+          <p:cNvPr id="53" name="Straight Connector 52">
+            <a:extLst>
+              <a:ext uri="{FF2B5EF4-FFF2-40B4-BE49-F238E27FC236}">
+                <a16:creationId xmlns:a16="http://schemas.microsoft.com/office/drawing/2014/main" id="{6DCF9D52-3784-4A72-8118-9FA8253DA680}"/>
+              </a:ext>
+            </a:extLst>
+          </p:cNvPr>
+          <p:cNvCxnSpPr>
+            <a:cxnSpLocks/>
+            <a:stCxn id="17" idx="1"/>
+            <a:endCxn id="27" idx="3"/>
+          </p:cNvCxnSpPr>
+          <p:nvPr/>
+        </p:nvCxnSpPr>
+        <p:spPr>
+          <a:xfrm flipH="1" flipV="1">
+            <a:off x="1550068" y="4921582"/>
+            <a:ext cx="1082889" cy="1"/>
+          </a:xfrm>
+          <a:prstGeom prst="line">
+            <a:avLst/>
+          </a:prstGeom>
+          <a:ln w="38100">
+            <a:solidFill>
+              <a:srgbClr val="C00000"/>
+            </a:solidFill>
+          </a:ln>
+        </p:spPr>
+        <p:style>
+          <a:lnRef idx="1">
+            <a:schemeClr val="accent1"/>
+          </a:lnRef>
+          <a:fillRef idx="0">
+            <a:schemeClr val="accent1"/>
+          </a:fillRef>
+          <a:effectRef idx="0">
+            <a:schemeClr val="accent1"/>
+          </a:effectRef>
+          <a:fontRef idx="minor">
+            <a:schemeClr val="tx1"/>
+          </a:fontRef>
+        </p:style>
+      </p:cxnSp>
+      <p:cxnSp>
+        <p:nvCxnSpPr>
+          <p:cNvPr id="48" name="Straight Connector 47">
+            <a:extLst>
+              <a:ext uri="{FF2B5EF4-FFF2-40B4-BE49-F238E27FC236}">
+                <a16:creationId xmlns:a16="http://schemas.microsoft.com/office/drawing/2014/main" id="{7CF791BA-A296-4468-BB92-5F5B192C4716}"/>
+              </a:ext>
+            </a:extLst>
+          </p:cNvPr>
+          <p:cNvCxnSpPr>
+            <a:stCxn id="12" idx="1"/>
+            <a:endCxn id="24" idx="3"/>
+          </p:cNvCxnSpPr>
+          <p:nvPr/>
+        </p:nvCxnSpPr>
+        <p:spPr>
+          <a:xfrm flipH="1">
+            <a:off x="1550068" y="2972909"/>
+            <a:ext cx="1082889" cy="9383"/>
+          </a:xfrm>
+          <a:prstGeom prst="line">
+            <a:avLst/>
+          </a:prstGeom>
+          <a:ln w="38100">
+            <a:solidFill>
+              <a:srgbClr val="30A0A6"/>
+            </a:solidFill>
+          </a:ln>
+        </p:spPr>
+        <p:style>
+          <a:lnRef idx="1">
+            <a:schemeClr val="accent1"/>
+          </a:lnRef>
+          <a:fillRef idx="0">
+            <a:schemeClr val="accent1"/>
+          </a:fillRef>
+          <a:effectRef idx="0">
+            <a:schemeClr val="accent1"/>
+          </a:effectRef>
+          <a:fontRef idx="minor">
+            <a:schemeClr val="tx1"/>
+          </a:fontRef>
+        </p:style>
+      </p:cxnSp>
+      <p:sp>
+        <p:nvSpPr>
+          <p:cNvPr id="13" name="Rectangle 12">
+            <a:extLst>
+              <a:ext uri="{FF2B5EF4-FFF2-40B4-BE49-F238E27FC236}">
+                <a16:creationId xmlns:a16="http://schemas.microsoft.com/office/drawing/2014/main" id="{54DFDD5E-F615-4808-9E70-A19270AC943F}"/>
+              </a:ext>
+            </a:extLst>
+          </p:cNvPr>
+          <p:cNvSpPr/>
+          <p:nvPr/>
+        </p:nvSpPr>
+        <p:spPr>
+          <a:xfrm>
+            <a:off x="180000" y="180000"/>
+            <a:ext cx="8784000" cy="6498000"/>
+          </a:xfrm>
+          <a:prstGeom prst="rect">
+            <a:avLst/>
+          </a:prstGeom>
+          <a:noFill/>
+          <a:ln w="38100">
+            <a:solidFill>
+              <a:srgbClr val="007C7C"/>
+            </a:solidFill>
+          </a:ln>
+        </p:spPr>
+        <p:style>
+          <a:lnRef idx="2">
+            <a:schemeClr val="accent1">
+              <a:shade val="50000"/>
+            </a:schemeClr>
+          </a:lnRef>
+          <a:fillRef idx="1">
+            <a:schemeClr val="accent1"/>
+          </a:fillRef>
+          <a:effectRef idx="0">
+            <a:schemeClr val="accent1"/>
+          </a:effectRef>
+          <a:fontRef idx="minor">
+            <a:schemeClr val="lt1"/>
+          </a:fontRef>
+        </p:style>
+        <p:txBody>
+          <a:bodyPr rtlCol="0" anchor="ctr"/>
+          <a:lstStyle/>
+          <a:p>
+            <a:pPr algn="ctr"/>
+            <a:endParaRPr lang="ru-RU">
+              <a:ln w="76200">
+                <a:solidFill>
+                  <a:schemeClr val="tx1"/>
+                </a:solidFill>
+              </a:ln>
+              <a:solidFill>
+                <a:srgbClr val="007C7C"/>
+              </a:solidFill>
+            </a:endParaRPr>
+          </a:p>
+        </p:txBody>
+      </p:sp>
+      <p:grpSp>
+        <p:nvGrpSpPr>
+          <p:cNvPr id="19" name="Group 18">
+            <a:extLst>
+              <a:ext uri="{FF2B5EF4-FFF2-40B4-BE49-F238E27FC236}">
+                <a16:creationId xmlns:a16="http://schemas.microsoft.com/office/drawing/2014/main" id="{69484D21-C1A0-4A38-A1BB-57F18BFBC20C}"/>
+              </a:ext>
+            </a:extLst>
+          </p:cNvPr>
+          <p:cNvGrpSpPr/>
+          <p:nvPr/>
+        </p:nvGrpSpPr>
+        <p:grpSpPr>
+          <a:xfrm>
+            <a:off x="8072783" y="180000"/>
+            <a:ext cx="891217" cy="786597"/>
+            <a:chOff x="7959968" y="254412"/>
+            <a:chExt cx="891217" cy="786597"/>
+          </a:xfrm>
+        </p:grpSpPr>
+        <p:sp>
+          <p:nvSpPr>
+            <p:cNvPr id="14" name="Rectangle 13">
+              <a:extLst>
+                <a:ext uri="{FF2B5EF4-FFF2-40B4-BE49-F238E27FC236}">
+                  <a16:creationId xmlns:a16="http://schemas.microsoft.com/office/drawing/2014/main" id="{B514341A-530B-426E-AC81-CBD573593AA6}"/>
+                </a:ext>
+              </a:extLst>
+            </p:cNvPr>
+            <p:cNvSpPr/>
+            <p:nvPr/>
+          </p:nvSpPr>
+          <p:spPr>
+            <a:xfrm>
+              <a:off x="7959968" y="254412"/>
+              <a:ext cx="891217" cy="786597"/>
+            </a:xfrm>
+            <a:prstGeom prst="rect">
+              <a:avLst/>
+            </a:prstGeom>
+            <a:noFill/>
+            <a:ln w="38100">
+              <a:solidFill>
+                <a:srgbClr val="007C7C"/>
+              </a:solidFill>
+            </a:ln>
+          </p:spPr>
+          <p:style>
+            <a:lnRef idx="2">
+              <a:schemeClr val="accent1">
+                <a:shade val="50000"/>
+              </a:schemeClr>
+            </a:lnRef>
+            <a:fillRef idx="1">
+              <a:schemeClr val="accent1"/>
+            </a:fillRef>
+            <a:effectRef idx="0">
+              <a:schemeClr val="accent1"/>
+            </a:effectRef>
+            <a:fontRef idx="minor">
+              <a:schemeClr val="lt1"/>
+            </a:fontRef>
+          </p:style>
+          <p:txBody>
+            <a:bodyPr rtlCol="0" anchor="ctr"/>
+            <a:lstStyle/>
+            <a:p>
+              <a:pPr algn="ctr"/>
+              <a:endParaRPr lang="ru-RU">
+                <a:ln w="76200">
+                  <a:solidFill>
+                    <a:schemeClr val="tx1"/>
+                  </a:solidFill>
+                </a:ln>
+                <a:solidFill>
+                  <a:srgbClr val="007C7C"/>
+                </a:solidFill>
+              </a:endParaRPr>
+            </a:p>
+          </p:txBody>
+        </p:sp>
+        <p:pic>
+          <p:nvPicPr>
+            <p:cNvPr id="15" name="Picture 14">
+              <a:extLst>
+                <a:ext uri="{FF2B5EF4-FFF2-40B4-BE49-F238E27FC236}">
+                  <a16:creationId xmlns:a16="http://schemas.microsoft.com/office/drawing/2014/main" id="{CD47B397-BAE8-426F-BF7A-A9B5B1AD5ED1}"/>
+                </a:ext>
+              </a:extLst>
+            </p:cNvPr>
+            <p:cNvPicPr>
+              <a:picLocks noChangeAspect="1"/>
+            </p:cNvPicPr>
+            <p:nvPr/>
+          </p:nvPicPr>
+          <p:blipFill>
+            <a:blip r:embed="rId2"/>
+            <a:stretch>
+              <a:fillRect/>
+            </a:stretch>
+          </p:blipFill>
+          <p:spPr>
+            <a:xfrm>
+              <a:off x="8019756" y="312419"/>
+              <a:ext cx="787791" cy="673006"/>
+            </a:xfrm>
+            <a:prstGeom prst="rect">
+              <a:avLst/>
+            </a:prstGeom>
+          </p:spPr>
+        </p:pic>
+      </p:grpSp>
+      <p:sp>
+        <p:nvSpPr>
+          <p:cNvPr id="11" name="Rectangle 10">
+            <a:extLst>
+              <a:ext uri="{FF2B5EF4-FFF2-40B4-BE49-F238E27FC236}">
+                <a16:creationId xmlns:a16="http://schemas.microsoft.com/office/drawing/2014/main" id="{2B8ADBA4-3277-4E7C-8FA8-9168ACA1C2CD}"/>
+              </a:ext>
+            </a:extLst>
+          </p:cNvPr>
+          <p:cNvSpPr/>
+          <p:nvPr/>
+        </p:nvSpPr>
+        <p:spPr>
+          <a:xfrm>
+            <a:off x="2632957" y="1604250"/>
+            <a:ext cx="1691754" cy="786597"/>
+          </a:xfrm>
+          <a:prstGeom prst="rect">
+            <a:avLst/>
+          </a:prstGeom>
+          <a:solidFill>
+            <a:srgbClr val="007C7C"/>
+          </a:solidFill>
+          <a:ln>
+            <a:noFill/>
+          </a:ln>
+        </p:spPr>
+        <p:style>
+          <a:lnRef idx="2">
+            <a:schemeClr val="accent1">
+              <a:shade val="50000"/>
+            </a:schemeClr>
+          </a:lnRef>
+          <a:fillRef idx="1">
+            <a:schemeClr val="accent1"/>
+          </a:fillRef>
+          <a:effectRef idx="0">
+            <a:schemeClr val="accent1"/>
+          </a:effectRef>
+          <a:fontRef idx="minor">
+            <a:schemeClr val="lt1"/>
+          </a:fontRef>
+        </p:style>
+        <p:txBody>
+          <a:bodyPr rot="0" spcFirstLastPara="0" vertOverflow="overflow" horzOverflow="overflow" vert="horz" wrap="square" lIns="91440" tIns="45720" rIns="91440" bIns="45720" numCol="1" spcCol="0" rtlCol="0" fromWordArt="0" anchor="ctr" anchorCtr="0" forceAA="0" compatLnSpc="1">
+            <a:prstTxWarp prst="textNoShape">
+              <a:avLst/>
+            </a:prstTxWarp>
+            <a:noAutofit/>
+          </a:bodyPr>
+          <a:lstStyle/>
+          <a:p>
+            <a:pPr algn="ctr"/>
+            <a:r>
+              <a:rPr lang="en-US" dirty="0"/>
+              <a:t>conscious</a:t>
+            </a:r>
+          </a:p>
+        </p:txBody>
+      </p:sp>
+      <p:sp>
+        <p:nvSpPr>
+          <p:cNvPr id="12" name="Rectangle 11">
+            <a:extLst>
+              <a:ext uri="{FF2B5EF4-FFF2-40B4-BE49-F238E27FC236}">
+                <a16:creationId xmlns:a16="http://schemas.microsoft.com/office/drawing/2014/main" id="{F480C12D-24B4-4CCC-8D07-18F5BBCD6DAB}"/>
+              </a:ext>
+            </a:extLst>
+          </p:cNvPr>
+          <p:cNvSpPr/>
+          <p:nvPr/>
+        </p:nvSpPr>
+        <p:spPr>
+          <a:xfrm>
+            <a:off x="2632957" y="2579610"/>
+            <a:ext cx="1691754" cy="786597"/>
+          </a:xfrm>
+          <a:prstGeom prst="rect">
+            <a:avLst/>
+          </a:prstGeom>
+          <a:solidFill>
+            <a:srgbClr val="30A0A6"/>
+          </a:solidFill>
+          <a:ln>
+            <a:noFill/>
+          </a:ln>
+        </p:spPr>
+        <p:style>
+          <a:lnRef idx="2">
+            <a:schemeClr val="accent1">
+              <a:shade val="50000"/>
+            </a:schemeClr>
+          </a:lnRef>
+          <a:fillRef idx="1">
+            <a:schemeClr val="accent1"/>
+          </a:fillRef>
+          <a:effectRef idx="0">
+            <a:schemeClr val="accent1"/>
+          </a:effectRef>
+          <a:fontRef idx="minor">
+            <a:schemeClr val="lt1"/>
+          </a:fontRef>
+        </p:style>
+        <p:txBody>
+          <a:bodyPr rot="0" spcFirstLastPara="0" vertOverflow="overflow" horzOverflow="overflow" vert="horz" wrap="square" lIns="91440" tIns="45720" rIns="91440" bIns="45720" numCol="1" spcCol="0" rtlCol="0" fromWordArt="0" anchor="ctr" anchorCtr="0" forceAA="0" compatLnSpc="1">
+            <a:prstTxWarp prst="textNoShape">
+              <a:avLst/>
+            </a:prstTxWarp>
+            <a:noAutofit/>
+          </a:bodyPr>
+          <a:lstStyle/>
+          <a:p>
+            <a:pPr algn="ctr"/>
+            <a:r>
+              <a:rPr lang="en-US" dirty="0"/>
+              <a:t>subconscious</a:t>
+            </a:r>
+          </a:p>
+        </p:txBody>
+      </p:sp>
+      <p:sp>
+        <p:nvSpPr>
+          <p:cNvPr id="16" name="Rectangle 15">
+            <a:extLst>
+              <a:ext uri="{FF2B5EF4-FFF2-40B4-BE49-F238E27FC236}">
+                <a16:creationId xmlns:a16="http://schemas.microsoft.com/office/drawing/2014/main" id="{CBC5416E-1252-44BE-A177-A760A2018FE0}"/>
+              </a:ext>
+            </a:extLst>
+          </p:cNvPr>
+          <p:cNvSpPr/>
+          <p:nvPr/>
+        </p:nvSpPr>
+        <p:spPr>
+          <a:xfrm>
+            <a:off x="2632957" y="3554970"/>
+            <a:ext cx="1691754" cy="786597"/>
+          </a:xfrm>
+          <a:prstGeom prst="rect">
+            <a:avLst/>
+          </a:prstGeom>
+          <a:solidFill>
+            <a:schemeClr val="bg1">
+              <a:lumMod val="50000"/>
+            </a:schemeClr>
+          </a:solidFill>
+          <a:ln>
+            <a:noFill/>
+          </a:ln>
+        </p:spPr>
+        <p:style>
+          <a:lnRef idx="2">
+            <a:schemeClr val="accent1">
+              <a:shade val="50000"/>
+            </a:schemeClr>
+          </a:lnRef>
+          <a:fillRef idx="1">
+            <a:schemeClr val="accent1"/>
+          </a:fillRef>
+          <a:effectRef idx="0">
+            <a:schemeClr val="accent1"/>
+          </a:effectRef>
+          <a:fontRef idx="minor">
+            <a:schemeClr val="lt1"/>
+          </a:fontRef>
+        </p:style>
+        <p:txBody>
+          <a:bodyPr rot="0" spcFirstLastPara="0" vertOverflow="overflow" horzOverflow="overflow" vert="horz" wrap="square" lIns="91440" tIns="45720" rIns="91440" bIns="45720" numCol="1" spcCol="0" rtlCol="0" fromWordArt="0" anchor="ctr" anchorCtr="0" forceAA="0" compatLnSpc="1">
+            <a:prstTxWarp prst="textNoShape">
+              <a:avLst/>
+            </a:prstTxWarp>
+            <a:noAutofit/>
+          </a:bodyPr>
+          <a:lstStyle/>
+          <a:p>
+            <a:pPr algn="ctr"/>
+            <a:r>
+              <a:rPr lang="en-US" dirty="0"/>
+              <a:t>unconscious</a:t>
+            </a:r>
+          </a:p>
+        </p:txBody>
+      </p:sp>
+      <p:sp>
+        <p:nvSpPr>
+          <p:cNvPr id="17" name="Rectangle 16">
+            <a:extLst>
+              <a:ext uri="{FF2B5EF4-FFF2-40B4-BE49-F238E27FC236}">
+                <a16:creationId xmlns:a16="http://schemas.microsoft.com/office/drawing/2014/main" id="{4B6806DF-BC5B-4075-B81A-73E4864EC513}"/>
+              </a:ext>
+            </a:extLst>
+          </p:cNvPr>
+          <p:cNvSpPr/>
+          <p:nvPr/>
+        </p:nvSpPr>
+        <p:spPr>
+          <a:xfrm>
+            <a:off x="2632957" y="4528284"/>
+            <a:ext cx="1691754" cy="786597"/>
+          </a:xfrm>
+          <a:prstGeom prst="rect">
+            <a:avLst/>
+          </a:prstGeom>
+          <a:solidFill>
+            <a:srgbClr val="C00000"/>
+          </a:solidFill>
+          <a:ln>
+            <a:noFill/>
+          </a:ln>
+        </p:spPr>
+        <p:style>
+          <a:lnRef idx="2">
+            <a:schemeClr val="accent1">
+              <a:shade val="50000"/>
+            </a:schemeClr>
+          </a:lnRef>
+          <a:fillRef idx="1">
+            <a:schemeClr val="accent1"/>
+          </a:fillRef>
+          <a:effectRef idx="0">
+            <a:schemeClr val="accent1"/>
+          </a:effectRef>
+          <a:fontRef idx="minor">
+            <a:schemeClr val="lt1"/>
+          </a:fontRef>
+        </p:style>
+        <p:txBody>
+          <a:bodyPr rot="0" spcFirstLastPara="0" vertOverflow="overflow" horzOverflow="overflow" vert="horz" wrap="square" lIns="91440" tIns="45720" rIns="91440" bIns="45720" numCol="1" spcCol="0" rtlCol="0" fromWordArt="0" anchor="ctr" anchorCtr="0" forceAA="0" compatLnSpc="1">
+            <a:prstTxWarp prst="textNoShape">
+              <a:avLst/>
+            </a:prstTxWarp>
+            <a:noAutofit/>
+          </a:bodyPr>
+          <a:lstStyle/>
+          <a:p>
+            <a:pPr algn="ctr"/>
+            <a:r>
+              <a:rPr lang="en-US" dirty="0"/>
+              <a:t>autonomous</a:t>
+            </a:r>
+          </a:p>
+        </p:txBody>
+      </p:sp>
+      <p:sp>
+        <p:nvSpPr>
+          <p:cNvPr id="20" name="Rectangle 19">
+            <a:extLst>
+              <a:ext uri="{FF2B5EF4-FFF2-40B4-BE49-F238E27FC236}">
+                <a16:creationId xmlns:a16="http://schemas.microsoft.com/office/drawing/2014/main" id="{4C3F36C8-1E7A-4C68-B452-033495E51DBE}"/>
+              </a:ext>
+            </a:extLst>
+          </p:cNvPr>
+          <p:cNvSpPr/>
+          <p:nvPr/>
+        </p:nvSpPr>
+        <p:spPr>
+          <a:xfrm>
+            <a:off x="4324710" y="1604250"/>
+            <a:ext cx="4112739" cy="786597"/>
+          </a:xfrm>
+          <a:prstGeom prst="rect">
+            <a:avLst/>
+          </a:prstGeom>
+          <a:solidFill>
+            <a:schemeClr val="bg1">
+              <a:lumMod val="85000"/>
+            </a:schemeClr>
+          </a:solidFill>
+          <a:ln>
+            <a:noFill/>
+          </a:ln>
+        </p:spPr>
+        <p:style>
+          <a:lnRef idx="2">
+            <a:schemeClr val="accent1">
+              <a:shade val="50000"/>
+            </a:schemeClr>
+          </a:lnRef>
+          <a:fillRef idx="1">
+            <a:schemeClr val="accent1"/>
+          </a:fillRef>
+          <a:effectRef idx="0">
+            <a:schemeClr val="accent1"/>
+          </a:effectRef>
+          <a:fontRef idx="minor">
+            <a:schemeClr val="lt1"/>
+          </a:fontRef>
+        </p:style>
+        <p:txBody>
+          <a:bodyPr rot="0" spcFirstLastPara="0" vertOverflow="overflow" horzOverflow="overflow" vert="horz" wrap="square" lIns="91440" tIns="45720" rIns="91440" bIns="45720" numCol="1" spcCol="0" rtlCol="0" fromWordArt="0" anchor="ctr" anchorCtr="0" forceAA="0" compatLnSpc="1">
+            <a:prstTxWarp prst="textNoShape">
+              <a:avLst/>
+            </a:prstTxWarp>
+            <a:noAutofit/>
+          </a:bodyPr>
+          <a:lstStyle/>
+          <a:p>
+            <a:r>
+              <a:rPr lang="en-US" sz="1400" dirty="0">
+                <a:solidFill>
+                  <a:schemeClr val="tx1">
+                    <a:lumMod val="50000"/>
+                    <a:lumOff val="50000"/>
+                  </a:schemeClr>
+                </a:solidFill>
+              </a:rPr>
+              <a:t>A node with the main program which is depending purposes and make decisions</a:t>
+            </a:r>
+          </a:p>
+        </p:txBody>
+      </p:sp>
+      <p:sp>
+        <p:nvSpPr>
+          <p:cNvPr id="21" name="Rectangle 20">
+            <a:extLst>
+              <a:ext uri="{FF2B5EF4-FFF2-40B4-BE49-F238E27FC236}">
+                <a16:creationId xmlns:a16="http://schemas.microsoft.com/office/drawing/2014/main" id="{A68A8E59-929C-4FBC-80EA-07DF8896BF5B}"/>
+              </a:ext>
+            </a:extLst>
+          </p:cNvPr>
+          <p:cNvSpPr/>
+          <p:nvPr/>
+        </p:nvSpPr>
+        <p:spPr>
+          <a:xfrm>
+            <a:off x="4324710" y="2577564"/>
+            <a:ext cx="4112739" cy="786597"/>
+          </a:xfrm>
+          <a:prstGeom prst="rect">
+            <a:avLst/>
+          </a:prstGeom>
+          <a:solidFill>
+            <a:schemeClr val="bg1">
+              <a:lumMod val="85000"/>
+            </a:schemeClr>
+          </a:solidFill>
+          <a:ln>
+            <a:noFill/>
+          </a:ln>
+        </p:spPr>
+        <p:style>
+          <a:lnRef idx="2">
+            <a:schemeClr val="accent1">
+              <a:shade val="50000"/>
+            </a:schemeClr>
+          </a:lnRef>
+          <a:fillRef idx="1">
+            <a:schemeClr val="accent1"/>
+          </a:fillRef>
+          <a:effectRef idx="0">
+            <a:schemeClr val="accent1"/>
+          </a:effectRef>
+          <a:fontRef idx="minor">
+            <a:schemeClr val="lt1"/>
+          </a:fontRef>
+        </p:style>
+        <p:txBody>
+          <a:bodyPr rot="0" spcFirstLastPara="0" vertOverflow="overflow" horzOverflow="overflow" vert="horz" wrap="square" lIns="91440" tIns="45720" rIns="91440" bIns="45720" numCol="1" spcCol="0" rtlCol="0" fromWordArt="0" anchor="ctr" anchorCtr="0" forceAA="0" compatLnSpc="1">
+            <a:prstTxWarp prst="textNoShape">
+              <a:avLst/>
+            </a:prstTxWarp>
+            <a:noAutofit/>
+          </a:bodyPr>
+          <a:lstStyle/>
+          <a:p>
+            <a:r>
+              <a:rPr lang="en-US" sz="1400" dirty="0">
+                <a:solidFill>
+                  <a:schemeClr val="tx1">
+                    <a:lumMod val="50000"/>
+                    <a:lumOff val="50000"/>
+                  </a:schemeClr>
+                </a:solidFill>
+              </a:rPr>
+              <a:t>A node with a sophisticated algorithms, which needed to be executed to achieve the purpose, including HAL</a:t>
+            </a:r>
+            <a:r>
+              <a:rPr lang="ru-RU" sz="1400" dirty="0">
+                <a:solidFill>
+                  <a:schemeClr val="tx1">
+                    <a:lumMod val="50000"/>
+                    <a:lumOff val="50000"/>
+                  </a:schemeClr>
+                </a:solidFill>
+              </a:rPr>
+              <a:t>, </a:t>
+            </a:r>
+            <a:r>
+              <a:rPr lang="en-US" sz="1400" dirty="0">
+                <a:solidFill>
+                  <a:schemeClr val="tx1">
+                    <a:lumMod val="50000"/>
+                    <a:lumOff val="50000"/>
+                  </a:schemeClr>
+                </a:solidFill>
+              </a:rPr>
+              <a:t>learning is here</a:t>
+            </a:r>
+          </a:p>
+        </p:txBody>
+      </p:sp>
+      <p:sp>
+        <p:nvSpPr>
+          <p:cNvPr id="22" name="Rectangle 21">
+            <a:extLst>
+              <a:ext uri="{FF2B5EF4-FFF2-40B4-BE49-F238E27FC236}">
+                <a16:creationId xmlns:a16="http://schemas.microsoft.com/office/drawing/2014/main" id="{EDD95DF0-1D25-4511-A07E-A6687F6EC459}"/>
+              </a:ext>
+            </a:extLst>
+          </p:cNvPr>
+          <p:cNvSpPr/>
+          <p:nvPr/>
+        </p:nvSpPr>
+        <p:spPr>
+          <a:xfrm>
+            <a:off x="4324710" y="3554970"/>
+            <a:ext cx="4112739" cy="786597"/>
+          </a:xfrm>
+          <a:prstGeom prst="rect">
+            <a:avLst/>
+          </a:prstGeom>
+          <a:solidFill>
+            <a:schemeClr val="bg1">
+              <a:lumMod val="85000"/>
+            </a:schemeClr>
+          </a:solidFill>
+          <a:ln>
+            <a:noFill/>
+          </a:ln>
+        </p:spPr>
+        <p:style>
+          <a:lnRef idx="2">
+            <a:schemeClr val="accent1">
+              <a:shade val="50000"/>
+            </a:schemeClr>
+          </a:lnRef>
+          <a:fillRef idx="1">
+            <a:schemeClr val="accent1"/>
+          </a:fillRef>
+          <a:effectRef idx="0">
+            <a:schemeClr val="accent1"/>
+          </a:effectRef>
+          <a:fontRef idx="minor">
+            <a:schemeClr val="lt1"/>
+          </a:fontRef>
+        </p:style>
+        <p:txBody>
+          <a:bodyPr rot="0" spcFirstLastPara="0" vertOverflow="overflow" horzOverflow="overflow" vert="horz" wrap="square" lIns="91440" tIns="45720" rIns="91440" bIns="45720" numCol="1" spcCol="0" rtlCol="0" fromWordArt="0" anchor="ctr" anchorCtr="0" forceAA="0" compatLnSpc="1">
+            <a:prstTxWarp prst="textNoShape">
+              <a:avLst/>
+            </a:prstTxWarp>
+            <a:noAutofit/>
+          </a:bodyPr>
+          <a:lstStyle/>
+          <a:p>
+            <a:r>
+              <a:rPr lang="en-US" sz="1400" dirty="0">
+                <a:solidFill>
+                  <a:schemeClr val="tx1">
+                    <a:lumMod val="50000"/>
+                    <a:lumOff val="50000"/>
+                  </a:schemeClr>
+                </a:solidFill>
+              </a:rPr>
+              <a:t>Reflexes: what is no needed to learn, basis of simple purposes like a survival, minimizing the harm, prior nature, emergency protocols</a:t>
+            </a:r>
+          </a:p>
+        </p:txBody>
+      </p:sp>
+      <p:sp>
+        <p:nvSpPr>
+          <p:cNvPr id="23" name="Rectangle 22">
+            <a:extLst>
+              <a:ext uri="{FF2B5EF4-FFF2-40B4-BE49-F238E27FC236}">
+                <a16:creationId xmlns:a16="http://schemas.microsoft.com/office/drawing/2014/main" id="{ED5F1170-0E4B-4D2E-B8B5-D3AB4AD6304B}"/>
+              </a:ext>
+            </a:extLst>
+          </p:cNvPr>
+          <p:cNvSpPr/>
+          <p:nvPr/>
+        </p:nvSpPr>
+        <p:spPr>
+          <a:xfrm>
+            <a:off x="4324709" y="4531332"/>
+            <a:ext cx="4112739" cy="786597"/>
+          </a:xfrm>
+          <a:prstGeom prst="rect">
+            <a:avLst/>
+          </a:prstGeom>
+          <a:solidFill>
+            <a:schemeClr val="bg1">
+              <a:lumMod val="85000"/>
+            </a:schemeClr>
+          </a:solidFill>
+          <a:ln>
+            <a:noFill/>
+          </a:ln>
+        </p:spPr>
+        <p:style>
+          <a:lnRef idx="2">
+            <a:schemeClr val="accent1">
+              <a:shade val="50000"/>
+            </a:schemeClr>
+          </a:lnRef>
+          <a:fillRef idx="1">
+            <a:schemeClr val="accent1"/>
+          </a:fillRef>
+          <a:effectRef idx="0">
+            <a:schemeClr val="accent1"/>
+          </a:effectRef>
+          <a:fontRef idx="minor">
+            <a:schemeClr val="lt1"/>
+          </a:fontRef>
+        </p:style>
+        <p:txBody>
+          <a:bodyPr rot="0" spcFirstLastPara="0" vertOverflow="overflow" horzOverflow="overflow" vert="horz" wrap="square" lIns="91440" tIns="45720" rIns="91440" bIns="45720" numCol="1" spcCol="0" rtlCol="0" fromWordArt="0" anchor="ctr" anchorCtr="0" forceAA="0" compatLnSpc="1">
+            <a:prstTxWarp prst="textNoShape">
+              <a:avLst/>
+            </a:prstTxWarp>
+            <a:noAutofit/>
+          </a:bodyPr>
+          <a:lstStyle/>
+          <a:p>
+            <a:r>
+              <a:rPr lang="en-US" sz="1400" dirty="0">
+                <a:solidFill>
+                  <a:schemeClr val="tx1">
+                    <a:lumMod val="50000"/>
+                    <a:lumOff val="50000"/>
+                  </a:schemeClr>
+                </a:solidFill>
+              </a:rPr>
+              <a:t>Drivers for specific devices, with own inputs and own decisions, like heart or thermal control</a:t>
+            </a:r>
+          </a:p>
+        </p:txBody>
+      </p:sp>
+      <p:sp>
+        <p:nvSpPr>
+          <p:cNvPr id="5" name="Flowchart: Alternate Process 4">
+            <a:extLst>
+              <a:ext uri="{FF2B5EF4-FFF2-40B4-BE49-F238E27FC236}">
+                <a16:creationId xmlns:a16="http://schemas.microsoft.com/office/drawing/2014/main" id="{8D568CE5-BA4E-4BC6-9DA2-C048D65510E8}"/>
+              </a:ext>
+            </a:extLst>
+          </p:cNvPr>
+          <p:cNvSpPr/>
+          <p:nvPr/>
+        </p:nvSpPr>
+        <p:spPr>
+          <a:xfrm>
+            <a:off x="791828" y="1773812"/>
+            <a:ext cx="1678804" cy="447472"/>
+          </a:xfrm>
+          <a:prstGeom prst="flowChartAlternateProcess">
+            <a:avLst/>
+          </a:prstGeom>
+          <a:solidFill>
+            <a:schemeClr val="tx1">
+              <a:lumMod val="75000"/>
+              <a:lumOff val="25000"/>
+            </a:schemeClr>
+          </a:solidFill>
+          <a:ln w="38100">
+            <a:solidFill>
+              <a:srgbClr val="007C7C"/>
+            </a:solidFill>
+          </a:ln>
+        </p:spPr>
+        <p:style>
+          <a:lnRef idx="2">
+            <a:schemeClr val="accent1">
+              <a:shade val="50000"/>
+            </a:schemeClr>
+          </a:lnRef>
+          <a:fillRef idx="1">
+            <a:schemeClr val="accent1"/>
+          </a:fillRef>
+          <a:effectRef idx="0">
+            <a:schemeClr val="accent1"/>
+          </a:effectRef>
+          <a:fontRef idx="minor">
+            <a:schemeClr val="lt1"/>
+          </a:fontRef>
+        </p:style>
+        <p:txBody>
+          <a:bodyPr rtlCol="0" anchor="ctr"/>
+          <a:lstStyle/>
+          <a:p>
+            <a:pPr algn="ctr"/>
+            <a:r>
+              <a:rPr lang="en-US" sz="900" dirty="0">
+                <a:solidFill>
+                  <a:schemeClr val="bg1"/>
+                </a:solidFill>
+              </a:rPr>
+              <a:t>user app</a:t>
+            </a:r>
+            <a:endParaRPr lang="ru-RU" sz="900" dirty="0">
+              <a:solidFill>
+                <a:schemeClr val="bg1"/>
+              </a:solidFill>
+            </a:endParaRPr>
+          </a:p>
+        </p:txBody>
+      </p:sp>
+      <p:sp>
+        <p:nvSpPr>
+          <p:cNvPr id="24" name="Flowchart: Alternate Process 23">
+            <a:extLst>
+              <a:ext uri="{FF2B5EF4-FFF2-40B4-BE49-F238E27FC236}">
+                <a16:creationId xmlns:a16="http://schemas.microsoft.com/office/drawing/2014/main" id="{8C9010EF-12C6-4E70-95B4-CED39B611425}"/>
+              </a:ext>
+            </a:extLst>
+          </p:cNvPr>
+          <p:cNvSpPr/>
+          <p:nvPr/>
+        </p:nvSpPr>
+        <p:spPr>
+          <a:xfrm>
+            <a:off x="791828" y="2758556"/>
+            <a:ext cx="758240" cy="447472"/>
+          </a:xfrm>
+          <a:prstGeom prst="flowChartAlternateProcess">
+            <a:avLst/>
+          </a:prstGeom>
+          <a:solidFill>
+            <a:schemeClr val="tx1">
+              <a:lumMod val="75000"/>
+              <a:lumOff val="25000"/>
+            </a:schemeClr>
+          </a:solidFill>
+          <a:ln w="38100">
+            <a:solidFill>
+              <a:srgbClr val="30A0A6"/>
+            </a:solidFill>
+          </a:ln>
+        </p:spPr>
+        <p:style>
+          <a:lnRef idx="2">
+            <a:schemeClr val="accent1">
+              <a:shade val="50000"/>
+            </a:schemeClr>
+          </a:lnRef>
+          <a:fillRef idx="1">
+            <a:schemeClr val="accent1"/>
+          </a:fillRef>
+          <a:effectRef idx="0">
+            <a:schemeClr val="accent1"/>
+          </a:effectRef>
+          <a:fontRef idx="minor">
+            <a:schemeClr val="lt1"/>
+          </a:fontRef>
+        </p:style>
+        <p:txBody>
+          <a:bodyPr rot="0" spcFirstLastPara="0" vertOverflow="overflow" horzOverflow="overflow" vert="horz" wrap="square" lIns="91440" tIns="45720" rIns="91440" bIns="45720" numCol="1" spcCol="0" rtlCol="0" fromWordArt="0" anchor="ctr" anchorCtr="0" forceAA="0" compatLnSpc="1">
+            <a:prstTxWarp prst="textNoShape">
+              <a:avLst/>
+            </a:prstTxWarp>
+            <a:noAutofit/>
+          </a:bodyPr>
+          <a:lstStyle/>
+          <a:p>
+            <a:pPr algn="ctr"/>
+            <a:r>
+              <a:rPr lang="en-US" sz="900">
+                <a:solidFill>
+                  <a:schemeClr val="bg1"/>
+                </a:solidFill>
+              </a:rPr>
+              <a:t>lib 1</a:t>
+            </a:r>
+            <a:endParaRPr lang="ru-RU" sz="900" dirty="0">
+              <a:solidFill>
+                <a:schemeClr val="bg1"/>
+              </a:solidFill>
+            </a:endParaRPr>
+          </a:p>
+        </p:txBody>
+      </p:sp>
+      <p:sp>
+        <p:nvSpPr>
+          <p:cNvPr id="25" name="Flowchart: Alternate Process 24">
+            <a:extLst>
+              <a:ext uri="{FF2B5EF4-FFF2-40B4-BE49-F238E27FC236}">
+                <a16:creationId xmlns:a16="http://schemas.microsoft.com/office/drawing/2014/main" id="{9B40E9DA-0BAC-41AF-B01F-F9C6D858406D}"/>
+              </a:ext>
+            </a:extLst>
+          </p:cNvPr>
+          <p:cNvSpPr/>
+          <p:nvPr/>
+        </p:nvSpPr>
+        <p:spPr>
+          <a:xfrm>
+            <a:off x="1712392" y="2758556"/>
+            <a:ext cx="758240" cy="447472"/>
+          </a:xfrm>
+          <a:prstGeom prst="flowChartAlternateProcess">
+            <a:avLst/>
+          </a:prstGeom>
+          <a:solidFill>
+            <a:schemeClr val="tx1">
+              <a:lumMod val="75000"/>
+              <a:lumOff val="25000"/>
+            </a:schemeClr>
+          </a:solidFill>
+          <a:ln w="38100">
+            <a:solidFill>
+              <a:srgbClr val="30A0A6"/>
+            </a:solidFill>
+          </a:ln>
+        </p:spPr>
+        <p:style>
+          <a:lnRef idx="2">
+            <a:schemeClr val="accent1">
+              <a:shade val="50000"/>
+            </a:schemeClr>
+          </a:lnRef>
+          <a:fillRef idx="1">
+            <a:schemeClr val="accent1"/>
+          </a:fillRef>
+          <a:effectRef idx="0">
+            <a:schemeClr val="accent1"/>
+          </a:effectRef>
+          <a:fontRef idx="minor">
+            <a:schemeClr val="lt1"/>
+          </a:fontRef>
+        </p:style>
+        <p:txBody>
+          <a:bodyPr rtlCol="0" anchor="ctr"/>
+          <a:lstStyle/>
+          <a:p>
+            <a:pPr algn="ctr"/>
+            <a:r>
+              <a:rPr lang="en-US" sz="900" dirty="0">
+                <a:solidFill>
+                  <a:schemeClr val="bg1"/>
+                </a:solidFill>
+              </a:rPr>
+              <a:t>lib n</a:t>
+            </a:r>
+            <a:endParaRPr lang="ru-RU" sz="900" dirty="0">
+              <a:solidFill>
+                <a:schemeClr val="bg1"/>
+              </a:solidFill>
+            </a:endParaRPr>
+          </a:p>
+        </p:txBody>
+      </p:sp>
+      <p:sp>
+        <p:nvSpPr>
+          <p:cNvPr id="27" name="Flowchart: Alternate Process 26">
+            <a:extLst>
+              <a:ext uri="{FF2B5EF4-FFF2-40B4-BE49-F238E27FC236}">
+                <a16:creationId xmlns:a16="http://schemas.microsoft.com/office/drawing/2014/main" id="{782D193C-31C9-4423-BF7A-3DDBF9C0FDA0}"/>
+              </a:ext>
+            </a:extLst>
+          </p:cNvPr>
+          <p:cNvSpPr/>
+          <p:nvPr/>
+        </p:nvSpPr>
+        <p:spPr>
+          <a:xfrm>
+            <a:off x="791828" y="4697846"/>
+            <a:ext cx="758240" cy="447472"/>
+          </a:xfrm>
+          <a:prstGeom prst="flowChartAlternateProcess">
+            <a:avLst/>
+          </a:prstGeom>
+          <a:solidFill>
+            <a:schemeClr val="tx1">
+              <a:lumMod val="75000"/>
+              <a:lumOff val="25000"/>
+            </a:schemeClr>
+          </a:solidFill>
+          <a:ln w="38100">
+            <a:solidFill>
+              <a:srgbClr val="C00000"/>
+            </a:solidFill>
+          </a:ln>
+        </p:spPr>
+        <p:style>
+          <a:lnRef idx="2">
+            <a:schemeClr val="accent1">
+              <a:shade val="50000"/>
+            </a:schemeClr>
+          </a:lnRef>
+          <a:fillRef idx="1">
+            <a:schemeClr val="accent1"/>
+          </a:fillRef>
+          <a:effectRef idx="0">
+            <a:schemeClr val="accent1"/>
+          </a:effectRef>
+          <a:fontRef idx="minor">
+            <a:schemeClr val="lt1"/>
+          </a:fontRef>
+        </p:style>
+        <p:txBody>
+          <a:bodyPr rot="0" spcFirstLastPara="0" vertOverflow="overflow" horzOverflow="overflow" vert="horz" wrap="square" lIns="91440" tIns="45720" rIns="91440" bIns="45720" numCol="1" spcCol="0" rtlCol="0" fromWordArt="0" anchor="ctr" anchorCtr="0" forceAA="0" compatLnSpc="1">
+            <a:prstTxWarp prst="textNoShape">
+              <a:avLst/>
+            </a:prstTxWarp>
+            <a:noAutofit/>
+          </a:bodyPr>
+          <a:lstStyle/>
+          <a:p>
+            <a:pPr algn="ctr"/>
+            <a:r>
+              <a:rPr lang="en-US" sz="900" dirty="0">
+                <a:solidFill>
+                  <a:schemeClr val="bg1"/>
+                </a:solidFill>
+              </a:rPr>
+              <a:t>HW </a:t>
+            </a:r>
+            <a:r>
+              <a:rPr lang="en-US" sz="900">
+                <a:solidFill>
+                  <a:schemeClr val="bg1"/>
+                </a:solidFill>
+              </a:rPr>
+              <a:t>firmware 1</a:t>
+            </a:r>
+            <a:endParaRPr lang="ru-RU" sz="900" dirty="0">
+              <a:solidFill>
+                <a:schemeClr val="bg1"/>
+              </a:solidFill>
+            </a:endParaRPr>
+          </a:p>
+        </p:txBody>
+      </p:sp>
+      <p:sp>
+        <p:nvSpPr>
+          <p:cNvPr id="28" name="Flowchart: Alternate Process 27">
+            <a:extLst>
+              <a:ext uri="{FF2B5EF4-FFF2-40B4-BE49-F238E27FC236}">
+                <a16:creationId xmlns:a16="http://schemas.microsoft.com/office/drawing/2014/main" id="{E52662FC-04CC-4CA3-A52B-E66B1CB91F53}"/>
+              </a:ext>
+            </a:extLst>
+          </p:cNvPr>
+          <p:cNvSpPr/>
+          <p:nvPr/>
+        </p:nvSpPr>
+        <p:spPr>
+          <a:xfrm>
+            <a:off x="1712392" y="4697846"/>
+            <a:ext cx="758240" cy="447472"/>
+          </a:xfrm>
+          <a:prstGeom prst="flowChartAlternateProcess">
+            <a:avLst/>
+          </a:prstGeom>
+          <a:solidFill>
+            <a:schemeClr val="tx1">
+              <a:lumMod val="75000"/>
+              <a:lumOff val="25000"/>
+            </a:schemeClr>
+          </a:solidFill>
+          <a:ln w="38100">
+            <a:solidFill>
+              <a:srgbClr val="C00000"/>
+            </a:solidFill>
+          </a:ln>
+        </p:spPr>
+        <p:style>
+          <a:lnRef idx="2">
+            <a:schemeClr val="accent1">
+              <a:shade val="50000"/>
+            </a:schemeClr>
+          </a:lnRef>
+          <a:fillRef idx="1">
+            <a:schemeClr val="accent1"/>
+          </a:fillRef>
+          <a:effectRef idx="0">
+            <a:schemeClr val="accent1"/>
+          </a:effectRef>
+          <a:fontRef idx="minor">
+            <a:schemeClr val="lt1"/>
+          </a:fontRef>
+        </p:style>
+        <p:txBody>
+          <a:bodyPr rtlCol="0" anchor="ctr"/>
+          <a:lstStyle/>
+          <a:p>
+            <a:pPr algn="ctr"/>
+            <a:r>
+              <a:rPr lang="en-US" sz="900" dirty="0">
+                <a:solidFill>
+                  <a:schemeClr val="bg1"/>
+                </a:solidFill>
+              </a:rPr>
+              <a:t>HW firmware n</a:t>
+            </a:r>
+            <a:endParaRPr lang="ru-RU" sz="900" dirty="0">
+              <a:solidFill>
+                <a:schemeClr val="bg1"/>
+              </a:solidFill>
+            </a:endParaRPr>
+          </a:p>
+        </p:txBody>
+      </p:sp>
+      <p:cxnSp>
+        <p:nvCxnSpPr>
+          <p:cNvPr id="30" name="Straight Arrow Connector 29">
+            <a:extLst>
+              <a:ext uri="{FF2B5EF4-FFF2-40B4-BE49-F238E27FC236}">
+                <a16:creationId xmlns:a16="http://schemas.microsoft.com/office/drawing/2014/main" id="{A6F6B193-BCFF-43F6-8888-DC3224CE8279}"/>
+              </a:ext>
+            </a:extLst>
+          </p:cNvPr>
+          <p:cNvCxnSpPr>
+            <a:stCxn id="26" idx="0"/>
+            <a:endCxn id="5" idx="2"/>
+          </p:cNvCxnSpPr>
+          <p:nvPr/>
+        </p:nvCxnSpPr>
+        <p:spPr>
+          <a:xfrm flipV="1">
+            <a:off x="1631230" y="2221284"/>
+            <a:ext cx="0" cy="1503248"/>
+          </a:xfrm>
+          <a:prstGeom prst="straightConnector1">
+            <a:avLst/>
+          </a:prstGeom>
+          <a:ln w="9525">
+            <a:solidFill>
+              <a:schemeClr val="accent2">
+                <a:lumMod val="75000"/>
+              </a:schemeClr>
+            </a:solidFill>
+            <a:tailEnd type="triangle"/>
+          </a:ln>
+        </p:spPr>
+        <p:style>
+          <a:lnRef idx="1">
+            <a:schemeClr val="accent1"/>
+          </a:lnRef>
+          <a:fillRef idx="0">
+            <a:schemeClr val="accent1"/>
+          </a:fillRef>
+          <a:effectRef idx="0">
+            <a:schemeClr val="accent1"/>
+          </a:effectRef>
+          <a:fontRef idx="minor">
+            <a:schemeClr val="tx1"/>
+          </a:fontRef>
+        </p:style>
+      </p:cxnSp>
+      <p:cxnSp>
+        <p:nvCxnSpPr>
+          <p:cNvPr id="32" name="Straight Arrow Connector 31">
+            <a:extLst>
+              <a:ext uri="{FF2B5EF4-FFF2-40B4-BE49-F238E27FC236}">
+                <a16:creationId xmlns:a16="http://schemas.microsoft.com/office/drawing/2014/main" id="{219654E0-8C17-40F2-A571-ABB02DC1DF8B}"/>
+              </a:ext>
+            </a:extLst>
+          </p:cNvPr>
+          <p:cNvCxnSpPr>
+            <a:cxnSpLocks/>
+            <a:stCxn id="26" idx="0"/>
+            <a:endCxn id="25" idx="2"/>
+          </p:cNvCxnSpPr>
+          <p:nvPr/>
+        </p:nvCxnSpPr>
+        <p:spPr>
+          <a:xfrm flipV="1">
+            <a:off x="1631230" y="3206028"/>
+            <a:ext cx="460282" cy="518504"/>
+          </a:xfrm>
+          <a:prstGeom prst="straightConnector1">
+            <a:avLst/>
+          </a:prstGeom>
+          <a:ln w="9525">
+            <a:solidFill>
+              <a:schemeClr val="accent2">
+                <a:lumMod val="75000"/>
+              </a:schemeClr>
+            </a:solidFill>
+            <a:tailEnd type="triangle"/>
+          </a:ln>
+        </p:spPr>
+        <p:style>
+          <a:lnRef idx="1">
+            <a:schemeClr val="accent1"/>
+          </a:lnRef>
+          <a:fillRef idx="0">
+            <a:schemeClr val="accent1"/>
+          </a:fillRef>
+          <a:effectRef idx="0">
+            <a:schemeClr val="accent1"/>
+          </a:effectRef>
+          <a:fontRef idx="minor">
+            <a:schemeClr val="tx1"/>
+          </a:fontRef>
+        </p:style>
+      </p:cxnSp>
+      <p:cxnSp>
+        <p:nvCxnSpPr>
+          <p:cNvPr id="36" name="Straight Arrow Connector 35">
+            <a:extLst>
+              <a:ext uri="{FF2B5EF4-FFF2-40B4-BE49-F238E27FC236}">
+                <a16:creationId xmlns:a16="http://schemas.microsoft.com/office/drawing/2014/main" id="{2344B197-1C4F-427D-A03C-9C8ED5A837CC}"/>
+              </a:ext>
+            </a:extLst>
+          </p:cNvPr>
+          <p:cNvCxnSpPr>
+            <a:cxnSpLocks/>
+            <a:stCxn id="26" idx="0"/>
+            <a:endCxn id="24" idx="2"/>
+          </p:cNvCxnSpPr>
+          <p:nvPr/>
+        </p:nvCxnSpPr>
+        <p:spPr>
+          <a:xfrm flipH="1" flipV="1">
+            <a:off x="1170948" y="3206028"/>
+            <a:ext cx="460282" cy="518504"/>
+          </a:xfrm>
+          <a:prstGeom prst="straightConnector1">
+            <a:avLst/>
+          </a:prstGeom>
+          <a:ln w="9525">
+            <a:solidFill>
+              <a:schemeClr val="accent2">
+                <a:lumMod val="75000"/>
+              </a:schemeClr>
+            </a:solidFill>
+            <a:tailEnd type="triangle"/>
+          </a:ln>
+        </p:spPr>
+        <p:style>
+          <a:lnRef idx="1">
+            <a:schemeClr val="accent1"/>
+          </a:lnRef>
+          <a:fillRef idx="0">
+            <a:schemeClr val="accent1"/>
+          </a:fillRef>
+          <a:effectRef idx="0">
+            <a:schemeClr val="accent1"/>
+          </a:effectRef>
+          <a:fontRef idx="minor">
+            <a:schemeClr val="tx1"/>
+          </a:fontRef>
+        </p:style>
+      </p:cxnSp>
+      <p:cxnSp>
+        <p:nvCxnSpPr>
+          <p:cNvPr id="40" name="Straight Arrow Connector 39">
+            <a:extLst>
+              <a:ext uri="{FF2B5EF4-FFF2-40B4-BE49-F238E27FC236}">
+                <a16:creationId xmlns:a16="http://schemas.microsoft.com/office/drawing/2014/main" id="{68A84CB5-8983-4B0E-B528-2371DC53186F}"/>
+              </a:ext>
+            </a:extLst>
+          </p:cNvPr>
+          <p:cNvCxnSpPr>
+            <a:cxnSpLocks/>
+            <a:endCxn id="25" idx="0"/>
+          </p:cNvCxnSpPr>
+          <p:nvPr/>
+        </p:nvCxnSpPr>
+        <p:spPr>
+          <a:xfrm>
+            <a:off x="1773470" y="2221284"/>
+            <a:ext cx="318042" cy="537272"/>
+          </a:xfrm>
+          <a:prstGeom prst="straightConnector1">
+            <a:avLst/>
+          </a:prstGeom>
+          <a:ln w="9525">
+            <a:solidFill>
+              <a:schemeClr val="accent2">
+                <a:lumMod val="75000"/>
+              </a:schemeClr>
+            </a:solidFill>
+            <a:tailEnd type="triangle"/>
+          </a:ln>
+        </p:spPr>
+        <p:style>
+          <a:lnRef idx="1">
+            <a:schemeClr val="accent1"/>
+          </a:lnRef>
+          <a:fillRef idx="0">
+            <a:schemeClr val="accent1"/>
+          </a:fillRef>
+          <a:effectRef idx="0">
+            <a:schemeClr val="accent1"/>
+          </a:effectRef>
+          <a:fontRef idx="minor">
+            <a:schemeClr val="tx1"/>
+          </a:fontRef>
+        </p:style>
+      </p:cxnSp>
+      <p:cxnSp>
+        <p:nvCxnSpPr>
+          <p:cNvPr id="42" name="Straight Arrow Connector 41">
+            <a:extLst>
+              <a:ext uri="{FF2B5EF4-FFF2-40B4-BE49-F238E27FC236}">
+                <a16:creationId xmlns:a16="http://schemas.microsoft.com/office/drawing/2014/main" id="{294A4826-8C19-465E-B459-C5D98C288949}"/>
+              </a:ext>
+            </a:extLst>
+          </p:cNvPr>
+          <p:cNvCxnSpPr>
+            <a:cxnSpLocks/>
+            <a:endCxn id="24" idx="0"/>
+          </p:cNvCxnSpPr>
+          <p:nvPr/>
+        </p:nvCxnSpPr>
+        <p:spPr>
+          <a:xfrm flipH="1">
+            <a:off x="1170948" y="2221284"/>
+            <a:ext cx="292642" cy="537272"/>
+          </a:xfrm>
+          <a:prstGeom prst="straightConnector1">
+            <a:avLst/>
+          </a:prstGeom>
+          <a:ln w="9525">
+            <a:solidFill>
+              <a:schemeClr val="accent2">
+                <a:lumMod val="75000"/>
+              </a:schemeClr>
+            </a:solidFill>
+            <a:tailEnd type="triangle"/>
+          </a:ln>
+        </p:spPr>
+        <p:style>
+          <a:lnRef idx="1">
+            <a:schemeClr val="accent1"/>
+          </a:lnRef>
+          <a:fillRef idx="0">
+            <a:schemeClr val="accent1"/>
+          </a:fillRef>
+          <a:effectRef idx="0">
+            <a:schemeClr val="accent1"/>
+          </a:effectRef>
+          <a:fontRef idx="minor">
+            <a:schemeClr val="tx1"/>
+          </a:fontRef>
+        </p:style>
+      </p:cxnSp>
+      <p:cxnSp>
+        <p:nvCxnSpPr>
+          <p:cNvPr id="44" name="Straight Arrow Connector 43">
+            <a:extLst>
+              <a:ext uri="{FF2B5EF4-FFF2-40B4-BE49-F238E27FC236}">
+                <a16:creationId xmlns:a16="http://schemas.microsoft.com/office/drawing/2014/main" id="{BF1ABCE0-6E49-4DCE-8F1F-190B5950B0EF}"/>
+              </a:ext>
+            </a:extLst>
+          </p:cNvPr>
+          <p:cNvCxnSpPr>
+            <a:cxnSpLocks/>
+          </p:cNvCxnSpPr>
+          <p:nvPr/>
+        </p:nvCxnSpPr>
+        <p:spPr>
+          <a:xfrm>
+            <a:off x="2233752" y="3206028"/>
+            <a:ext cx="0" cy="1491818"/>
+          </a:xfrm>
+          <a:prstGeom prst="straightConnector1">
+            <a:avLst/>
+          </a:prstGeom>
+          <a:ln w="9525">
+            <a:solidFill>
+              <a:schemeClr val="accent2">
+                <a:lumMod val="75000"/>
+              </a:schemeClr>
+            </a:solidFill>
+            <a:tailEnd type="triangle"/>
+          </a:ln>
+        </p:spPr>
+        <p:style>
+          <a:lnRef idx="1">
+            <a:schemeClr val="accent1"/>
+          </a:lnRef>
+          <a:fillRef idx="0">
+            <a:schemeClr val="accent1"/>
+          </a:fillRef>
+          <a:effectRef idx="0">
+            <a:schemeClr val="accent1"/>
+          </a:effectRef>
+          <a:fontRef idx="minor">
+            <a:schemeClr val="tx1"/>
+          </a:fontRef>
+        </p:style>
+      </p:cxnSp>
+      <p:cxnSp>
+        <p:nvCxnSpPr>
+          <p:cNvPr id="46" name="Straight Arrow Connector 45">
+            <a:extLst>
+              <a:ext uri="{FF2B5EF4-FFF2-40B4-BE49-F238E27FC236}">
+                <a16:creationId xmlns:a16="http://schemas.microsoft.com/office/drawing/2014/main" id="{530822BC-B322-4740-8788-F803A6DD95BD}"/>
+              </a:ext>
+            </a:extLst>
+          </p:cNvPr>
+          <p:cNvCxnSpPr>
+            <a:cxnSpLocks/>
+          </p:cNvCxnSpPr>
+          <p:nvPr/>
+        </p:nvCxnSpPr>
+        <p:spPr>
+          <a:xfrm>
+            <a:off x="1003308" y="3206028"/>
+            <a:ext cx="0" cy="1491818"/>
+          </a:xfrm>
+          <a:prstGeom prst="straightConnector1">
+            <a:avLst/>
+          </a:prstGeom>
+          <a:ln w="9525">
+            <a:solidFill>
+              <a:schemeClr val="accent2">
+                <a:lumMod val="75000"/>
+              </a:schemeClr>
+            </a:solidFill>
+            <a:tailEnd type="triangle"/>
+          </a:ln>
+        </p:spPr>
+        <p:style>
+          <a:lnRef idx="1">
+            <a:schemeClr val="accent1"/>
+          </a:lnRef>
+          <a:fillRef idx="0">
+            <a:schemeClr val="accent1"/>
+          </a:fillRef>
+          <a:effectRef idx="0">
+            <a:schemeClr val="accent1"/>
+          </a:effectRef>
+          <a:fontRef idx="minor">
+            <a:schemeClr val="tx1"/>
+          </a:fontRef>
+        </p:style>
+      </p:cxnSp>
+      <p:cxnSp>
+        <p:nvCxnSpPr>
+          <p:cNvPr id="49" name="Straight Connector 48">
+            <a:extLst>
+              <a:ext uri="{FF2B5EF4-FFF2-40B4-BE49-F238E27FC236}">
+                <a16:creationId xmlns:a16="http://schemas.microsoft.com/office/drawing/2014/main" id="{705F0B85-797B-4E54-8297-5EF629F6BA82}"/>
+              </a:ext>
+            </a:extLst>
+          </p:cNvPr>
+          <p:cNvCxnSpPr>
+            <a:cxnSpLocks/>
+            <a:stCxn id="11" idx="1"/>
+            <a:endCxn id="5" idx="3"/>
+          </p:cNvCxnSpPr>
+          <p:nvPr/>
+        </p:nvCxnSpPr>
+        <p:spPr>
+          <a:xfrm flipH="1" flipV="1">
+            <a:off x="2470632" y="1997548"/>
+            <a:ext cx="162325" cy="1"/>
+          </a:xfrm>
+          <a:prstGeom prst="line">
+            <a:avLst/>
+          </a:prstGeom>
+          <a:ln w="38100">
+            <a:solidFill>
+              <a:srgbClr val="007C7C"/>
+            </a:solidFill>
+          </a:ln>
+        </p:spPr>
+        <p:style>
+          <a:lnRef idx="1">
+            <a:schemeClr val="accent1"/>
+          </a:lnRef>
+          <a:fillRef idx="0">
+            <a:schemeClr val="accent1"/>
+          </a:fillRef>
+          <a:effectRef idx="0">
+            <a:schemeClr val="accent1"/>
+          </a:effectRef>
+          <a:fontRef idx="minor">
+            <a:schemeClr val="tx1"/>
+          </a:fontRef>
+        </p:style>
+      </p:cxnSp>
+      <p:cxnSp>
+        <p:nvCxnSpPr>
+          <p:cNvPr id="52" name="Straight Connector 51">
+            <a:extLst>
+              <a:ext uri="{FF2B5EF4-FFF2-40B4-BE49-F238E27FC236}">
+                <a16:creationId xmlns:a16="http://schemas.microsoft.com/office/drawing/2014/main" id="{5157DF6B-1247-41F1-A257-4DE7BF660918}"/>
+              </a:ext>
+            </a:extLst>
+          </p:cNvPr>
+          <p:cNvCxnSpPr>
+            <a:cxnSpLocks/>
+          </p:cNvCxnSpPr>
+          <p:nvPr/>
+        </p:nvCxnSpPr>
+        <p:spPr>
+          <a:xfrm flipH="1" flipV="1">
+            <a:off x="2470632" y="3952903"/>
+            <a:ext cx="162325" cy="1"/>
+          </a:xfrm>
+          <a:prstGeom prst="line">
+            <a:avLst/>
+          </a:prstGeom>
+          <a:ln w="38100">
+            <a:solidFill>
+              <a:schemeClr val="bg1">
+                <a:lumMod val="50000"/>
+              </a:schemeClr>
+            </a:solidFill>
+          </a:ln>
+        </p:spPr>
+        <p:style>
+          <a:lnRef idx="1">
+            <a:schemeClr val="accent1"/>
+          </a:lnRef>
+          <a:fillRef idx="0">
+            <a:schemeClr val="accent1"/>
+          </a:fillRef>
+          <a:effectRef idx="0">
+            <a:schemeClr val="accent1"/>
+          </a:effectRef>
+          <a:fontRef idx="minor">
+            <a:schemeClr val="tx1"/>
+          </a:fontRef>
+        </p:style>
+      </p:cxnSp>
+      <p:sp>
+        <p:nvSpPr>
+          <p:cNvPr id="26" name="Flowchart: Alternate Process 25">
+            <a:extLst>
+              <a:ext uri="{FF2B5EF4-FFF2-40B4-BE49-F238E27FC236}">
+                <a16:creationId xmlns:a16="http://schemas.microsoft.com/office/drawing/2014/main" id="{357DF0B6-62A0-4012-91FA-574208097506}"/>
+              </a:ext>
+            </a:extLst>
+          </p:cNvPr>
+          <p:cNvSpPr/>
+          <p:nvPr/>
+        </p:nvSpPr>
+        <p:spPr>
+          <a:xfrm>
+            <a:off x="791828" y="3724532"/>
+            <a:ext cx="1678804" cy="447472"/>
+          </a:xfrm>
+          <a:prstGeom prst="flowChartAlternateProcess">
+            <a:avLst/>
+          </a:prstGeom>
+          <a:solidFill>
+            <a:schemeClr val="tx1">
+              <a:lumMod val="75000"/>
+              <a:lumOff val="25000"/>
+            </a:schemeClr>
+          </a:solidFill>
+          <a:ln w="38100">
+            <a:solidFill>
+              <a:schemeClr val="bg1">
+                <a:lumMod val="50000"/>
+              </a:schemeClr>
+            </a:solidFill>
+          </a:ln>
+        </p:spPr>
+        <p:style>
+          <a:lnRef idx="2">
+            <a:schemeClr val="accent1">
+              <a:shade val="50000"/>
+            </a:schemeClr>
+          </a:lnRef>
+          <a:fillRef idx="1">
+            <a:schemeClr val="accent1"/>
+          </a:fillRef>
+          <a:effectRef idx="0">
+            <a:schemeClr val="accent1"/>
+          </a:effectRef>
+          <a:fontRef idx="minor">
+            <a:schemeClr val="lt1"/>
+          </a:fontRef>
+        </p:style>
+        <p:txBody>
+          <a:bodyPr rtlCol="0" anchor="ctr"/>
+          <a:lstStyle/>
+          <a:p>
+            <a:pPr algn="ctr"/>
+            <a:r>
+              <a:rPr lang="en-US" sz="900" dirty="0">
+                <a:solidFill>
+                  <a:schemeClr val="bg1"/>
+                </a:solidFill>
+              </a:rPr>
+              <a:t>main app launching a user app</a:t>
+            </a:r>
+            <a:endParaRPr lang="ru-RU" sz="900" dirty="0">
+              <a:solidFill>
+                <a:schemeClr val="bg1"/>
+              </a:solidFill>
+            </a:endParaRPr>
+          </a:p>
+        </p:txBody>
+      </p:sp>
+    </p:spTree>
+    <p:extLst>
+      <p:ext uri="{BB962C8B-B14F-4D97-AF65-F5344CB8AC3E}">
+        <p14:creationId xmlns:p14="http://schemas.microsoft.com/office/powerpoint/2010/main" val="3998175219"/>
+      </p:ext>
+    </p:extLst>
+  </p:cSld>
+  <p:clrMapOvr>
+    <a:masterClrMapping/>
+  </p:clrMapOvr>
+</p:sld>
+</file>
+
+<file path=ppt/slides/slide2.xml><?xml version="1.0" encoding="utf-8"?>
 <p:sld xmlns:a="http://schemas.openxmlformats.org/drawingml/2006/main" xmlns:r="http://schemas.openxmlformats.org/officeDocument/2006/relationships" xmlns:p="http://schemas.openxmlformats.org/presentationml/2006/main">
   <p:cSld>
     <p:spTree>
@@ -3571,7 +5252,7 @@
 </p:sld>
 </file>
 
-<file path=ppt/slides/slide2.xml><?xml version="1.0" encoding="utf-8"?>
+<file path=ppt/slides/slide3.xml><?xml version="1.0" encoding="utf-8"?>
 <p:sld xmlns:a="http://schemas.openxmlformats.org/drawingml/2006/main" xmlns:r="http://schemas.openxmlformats.org/officeDocument/2006/relationships" xmlns:p="http://schemas.openxmlformats.org/presentationml/2006/main">
   <p:cSld>
     <p:spTree>
@@ -4320,7 +6001,7 @@
 </p:sld>
 </file>
 
-<file path=ppt/slides/slide3.xml><?xml version="1.0" encoding="utf-8"?>
+<file path=ppt/slides/slide4.xml><?xml version="1.0" encoding="utf-8"?>
 <p:sld xmlns:a="http://schemas.openxmlformats.org/drawingml/2006/main" xmlns:r="http://schemas.openxmlformats.org/officeDocument/2006/relationships" xmlns:p="http://schemas.openxmlformats.org/presentationml/2006/main">
   <p:cSld>
     <p:spTree>
@@ -4645,7 +6326,7 @@
         </p:nvSpPr>
         <p:spPr>
           <a:xfrm>
-            <a:off x="1348274" y="1341194"/>
+            <a:off x="1353882" y="1341194"/>
             <a:ext cx="1691755" cy="786597"/>
           </a:xfrm>
           <a:prstGeom prst="rect">
@@ -4871,8 +6552,8 @@
         </p:nvSpPr>
         <p:spPr>
           <a:xfrm>
-            <a:off x="1348274" y="2149502"/>
-            <a:ext cx="1691755" cy="3367304"/>
+            <a:off x="1348272" y="2127791"/>
+            <a:ext cx="1691755" cy="3394822"/>
           </a:xfrm>
           <a:prstGeom prst="rect">
             <a:avLst/>
@@ -5193,7 +6874,7 @@
 </p:sld>
 </file>
 
-<file path=ppt/slides/slide4.xml><?xml version="1.0" encoding="utf-8"?>
+<file path=ppt/slides/slide5.xml><?xml version="1.0" encoding="utf-8"?>
 <p:sld xmlns:a="http://schemas.openxmlformats.org/drawingml/2006/main" xmlns:r="http://schemas.openxmlformats.org/officeDocument/2006/relationships" xmlns:p="http://schemas.openxmlformats.org/presentationml/2006/main">
   <p:cSld>
     <p:spTree>
@@ -6386,7 +8067,7 @@
 </p:sld>
 </file>
 
-<file path=ppt/slides/slide5.xml><?xml version="1.0" encoding="utf-8"?>
+<file path=ppt/slides/slide6.xml><?xml version="1.0" encoding="utf-8"?>
 <p:sld xmlns:a="http://schemas.openxmlformats.org/drawingml/2006/main" xmlns:r="http://schemas.openxmlformats.org/officeDocument/2006/relationships" xmlns:p="http://schemas.openxmlformats.org/presentationml/2006/main">
   <p:cSld>
     <p:spTree>
@@ -6610,209 +8291,6 @@
     <p:extLst>
       <p:ext uri="{BB962C8B-B14F-4D97-AF65-F5344CB8AC3E}">
         <p14:creationId xmlns:p14="http://schemas.microsoft.com/office/powerpoint/2010/main" val="3265262059"/>
-      </p:ext>
-    </p:extLst>
-  </p:cSld>
-  <p:clrMapOvr>
-    <a:masterClrMapping/>
-  </p:clrMapOvr>
-</p:sld>
-</file>
-
-<file path=ppt/slides/slide6.xml><?xml version="1.0" encoding="utf-8"?>
-<p:sld xmlns:a="http://schemas.openxmlformats.org/drawingml/2006/main" xmlns:r="http://schemas.openxmlformats.org/officeDocument/2006/relationships" xmlns:p="http://schemas.openxmlformats.org/presentationml/2006/main">
-  <p:cSld>
-    <p:spTree>
-      <p:nvGrpSpPr>
-        <p:cNvPr id="1" name=""/>
-        <p:cNvGrpSpPr/>
-        <p:nvPr/>
-      </p:nvGrpSpPr>
-      <p:grpSpPr>
-        <a:xfrm>
-          <a:off x="0" y="0"/>
-          <a:ext cx="0" cy="0"/>
-          <a:chOff x="0" y="0"/>
-          <a:chExt cx="0" cy="0"/>
-        </a:xfrm>
-      </p:grpSpPr>
-      <p:sp>
-        <p:nvSpPr>
-          <p:cNvPr id="13" name="Rectangle 12">
-            <a:extLst>
-              <a:ext uri="{FF2B5EF4-FFF2-40B4-BE49-F238E27FC236}">
-                <a16:creationId xmlns:a16="http://schemas.microsoft.com/office/drawing/2014/main" id="{54DFDD5E-F615-4808-9E70-A19270AC943F}"/>
-              </a:ext>
-            </a:extLst>
-          </p:cNvPr>
-          <p:cNvSpPr/>
-          <p:nvPr/>
-        </p:nvSpPr>
-        <p:spPr>
-          <a:xfrm>
-            <a:off x="180000" y="180000"/>
-            <a:ext cx="8784000" cy="6498000"/>
-          </a:xfrm>
-          <a:prstGeom prst="rect">
-            <a:avLst/>
-          </a:prstGeom>
-          <a:noFill/>
-          <a:ln w="38100">
-            <a:solidFill>
-              <a:srgbClr val="007C7C"/>
-            </a:solidFill>
-          </a:ln>
-        </p:spPr>
-        <p:style>
-          <a:lnRef idx="2">
-            <a:schemeClr val="accent1">
-              <a:shade val="50000"/>
-            </a:schemeClr>
-          </a:lnRef>
-          <a:fillRef idx="1">
-            <a:schemeClr val="accent1"/>
-          </a:fillRef>
-          <a:effectRef idx="0">
-            <a:schemeClr val="accent1"/>
-          </a:effectRef>
-          <a:fontRef idx="minor">
-            <a:schemeClr val="lt1"/>
-          </a:fontRef>
-        </p:style>
-        <p:txBody>
-          <a:bodyPr rtlCol="0" anchor="ctr"/>
-          <a:lstStyle/>
-          <a:p>
-            <a:pPr algn="ctr"/>
-            <a:endParaRPr lang="ru-RU">
-              <a:ln w="76200">
-                <a:solidFill>
-                  <a:schemeClr val="tx1"/>
-                </a:solidFill>
-              </a:ln>
-              <a:solidFill>
-                <a:srgbClr val="007C7C"/>
-              </a:solidFill>
-            </a:endParaRPr>
-          </a:p>
-        </p:txBody>
-      </p:sp>
-      <p:grpSp>
-        <p:nvGrpSpPr>
-          <p:cNvPr id="19" name="Group 18">
-            <a:extLst>
-              <a:ext uri="{FF2B5EF4-FFF2-40B4-BE49-F238E27FC236}">
-                <a16:creationId xmlns:a16="http://schemas.microsoft.com/office/drawing/2014/main" id="{69484D21-C1A0-4A38-A1BB-57F18BFBC20C}"/>
-              </a:ext>
-            </a:extLst>
-          </p:cNvPr>
-          <p:cNvGrpSpPr/>
-          <p:nvPr/>
-        </p:nvGrpSpPr>
-        <p:grpSpPr>
-          <a:xfrm>
-            <a:off x="8072783" y="180000"/>
-            <a:ext cx="891217" cy="786597"/>
-            <a:chOff x="7959968" y="254412"/>
-            <a:chExt cx="891217" cy="786597"/>
-          </a:xfrm>
-        </p:grpSpPr>
-        <p:sp>
-          <p:nvSpPr>
-            <p:cNvPr id="14" name="Rectangle 13">
-              <a:extLst>
-                <a:ext uri="{FF2B5EF4-FFF2-40B4-BE49-F238E27FC236}">
-                  <a16:creationId xmlns:a16="http://schemas.microsoft.com/office/drawing/2014/main" id="{B514341A-530B-426E-AC81-CBD573593AA6}"/>
-                </a:ext>
-              </a:extLst>
-            </p:cNvPr>
-            <p:cNvSpPr/>
-            <p:nvPr/>
-          </p:nvSpPr>
-          <p:spPr>
-            <a:xfrm>
-              <a:off x="7959968" y="254412"/>
-              <a:ext cx="891217" cy="786597"/>
-            </a:xfrm>
-            <a:prstGeom prst="rect">
-              <a:avLst/>
-            </a:prstGeom>
-            <a:noFill/>
-            <a:ln w="38100">
-              <a:solidFill>
-                <a:srgbClr val="007C7C"/>
-              </a:solidFill>
-            </a:ln>
-          </p:spPr>
-          <p:style>
-            <a:lnRef idx="2">
-              <a:schemeClr val="accent1">
-                <a:shade val="50000"/>
-              </a:schemeClr>
-            </a:lnRef>
-            <a:fillRef idx="1">
-              <a:schemeClr val="accent1"/>
-            </a:fillRef>
-            <a:effectRef idx="0">
-              <a:schemeClr val="accent1"/>
-            </a:effectRef>
-            <a:fontRef idx="minor">
-              <a:schemeClr val="lt1"/>
-            </a:fontRef>
-          </p:style>
-          <p:txBody>
-            <a:bodyPr rtlCol="0" anchor="ctr"/>
-            <a:lstStyle/>
-            <a:p>
-              <a:pPr algn="ctr"/>
-              <a:endParaRPr lang="ru-RU">
-                <a:ln w="76200">
-                  <a:solidFill>
-                    <a:schemeClr val="tx1"/>
-                  </a:solidFill>
-                </a:ln>
-                <a:solidFill>
-                  <a:srgbClr val="007C7C"/>
-                </a:solidFill>
-              </a:endParaRPr>
-            </a:p>
-          </p:txBody>
-        </p:sp>
-        <p:pic>
-          <p:nvPicPr>
-            <p:cNvPr id="15" name="Picture 14">
-              <a:extLst>
-                <a:ext uri="{FF2B5EF4-FFF2-40B4-BE49-F238E27FC236}">
-                  <a16:creationId xmlns:a16="http://schemas.microsoft.com/office/drawing/2014/main" id="{CD47B397-BAE8-426F-BF7A-A9B5B1AD5ED1}"/>
-                </a:ext>
-              </a:extLst>
-            </p:cNvPr>
-            <p:cNvPicPr>
-              <a:picLocks noChangeAspect="1"/>
-            </p:cNvPicPr>
-            <p:nvPr/>
-          </p:nvPicPr>
-          <p:blipFill>
-            <a:blip r:embed="rId2"/>
-            <a:stretch>
-              <a:fillRect/>
-            </a:stretch>
-          </p:blipFill>
-          <p:spPr>
-            <a:xfrm>
-              <a:off x="8019756" y="312419"/>
-              <a:ext cx="787791" cy="673006"/>
-            </a:xfrm>
-            <a:prstGeom prst="rect">
-              <a:avLst/>
-            </a:prstGeom>
-          </p:spPr>
-        </p:pic>
-      </p:grpSp>
-    </p:spTree>
-    <p:extLst>
-      <p:ext uri="{BB962C8B-B14F-4D97-AF65-F5344CB8AC3E}">
-        <p14:creationId xmlns:p14="http://schemas.microsoft.com/office/powerpoint/2010/main" val="3998175219"/>
       </p:ext>
     </p:extLst>
   </p:cSld>

</xml_diff>